<commit_message>
Working in the workbench
</commit_message>
<xml_diff>
--- a/other-projects/workbench/diagrams.pptx
+++ b/other-projects/workbench/diagrams.pptx
@@ -104,6 +104,11 @@
       </a:defRPr>
     </a:lvl9pPr>
   </p:defaultTextStyle>
+  <p:extLst>
+    <p:ext uri="{EFAFB233-063F-42B5-8137-9DF3F51BA10A}">
+      <p15:sldGuideLst xmlns:p15="http://schemas.microsoft.com/office/powerpoint/2012/main"/>
+    </p:ext>
+  </p:extLst>
 </p:presentation>
 </file>
 
@@ -256,7 +261,7 @@
           <a:p>
             <a:fld id="{7992EB8D-9690-4F75-926D-7A077194FDDF}" type="datetimeFigureOut">
               <a:rPr lang="en-CH" smtClean="0"/>
-              <a:t>21/04/2023</a:t>
+              <a:t>04/05/2023</a:t>
             </a:fld>
             <a:endParaRPr lang="en-CH"/>
           </a:p>
@@ -456,7 +461,7 @@
           <a:p>
             <a:fld id="{7992EB8D-9690-4F75-926D-7A077194FDDF}" type="datetimeFigureOut">
               <a:rPr lang="en-CH" smtClean="0"/>
-              <a:t>21/04/2023</a:t>
+              <a:t>04/05/2023</a:t>
             </a:fld>
             <a:endParaRPr lang="en-CH"/>
           </a:p>
@@ -666,7 +671,7 @@
           <a:p>
             <a:fld id="{7992EB8D-9690-4F75-926D-7A077194FDDF}" type="datetimeFigureOut">
               <a:rPr lang="en-CH" smtClean="0"/>
-              <a:t>21/04/2023</a:t>
+              <a:t>04/05/2023</a:t>
             </a:fld>
             <a:endParaRPr lang="en-CH"/>
           </a:p>
@@ -866,7 +871,7 @@
           <a:p>
             <a:fld id="{7992EB8D-9690-4F75-926D-7A077194FDDF}" type="datetimeFigureOut">
               <a:rPr lang="en-CH" smtClean="0"/>
-              <a:t>21/04/2023</a:t>
+              <a:t>04/05/2023</a:t>
             </a:fld>
             <a:endParaRPr lang="en-CH"/>
           </a:p>
@@ -1142,7 +1147,7 @@
           <a:p>
             <a:fld id="{7992EB8D-9690-4F75-926D-7A077194FDDF}" type="datetimeFigureOut">
               <a:rPr lang="en-CH" smtClean="0"/>
-              <a:t>21/04/2023</a:t>
+              <a:t>04/05/2023</a:t>
             </a:fld>
             <a:endParaRPr lang="en-CH"/>
           </a:p>
@@ -1410,7 +1415,7 @@
           <a:p>
             <a:fld id="{7992EB8D-9690-4F75-926D-7A077194FDDF}" type="datetimeFigureOut">
               <a:rPr lang="en-CH" smtClean="0"/>
-              <a:t>21/04/2023</a:t>
+              <a:t>04/05/2023</a:t>
             </a:fld>
             <a:endParaRPr lang="en-CH"/>
           </a:p>
@@ -1825,7 +1830,7 @@
           <a:p>
             <a:fld id="{7992EB8D-9690-4F75-926D-7A077194FDDF}" type="datetimeFigureOut">
               <a:rPr lang="en-CH" smtClean="0"/>
-              <a:t>21/04/2023</a:t>
+              <a:t>04/05/2023</a:t>
             </a:fld>
             <a:endParaRPr lang="en-CH"/>
           </a:p>
@@ -1967,7 +1972,7 @@
           <a:p>
             <a:fld id="{7992EB8D-9690-4F75-926D-7A077194FDDF}" type="datetimeFigureOut">
               <a:rPr lang="en-CH" smtClean="0"/>
-              <a:t>21/04/2023</a:t>
+              <a:t>04/05/2023</a:t>
             </a:fld>
             <a:endParaRPr lang="en-CH"/>
           </a:p>
@@ -2080,7 +2085,7 @@
           <a:p>
             <a:fld id="{7992EB8D-9690-4F75-926D-7A077194FDDF}" type="datetimeFigureOut">
               <a:rPr lang="en-CH" smtClean="0"/>
-              <a:t>21/04/2023</a:t>
+              <a:t>04/05/2023</a:t>
             </a:fld>
             <a:endParaRPr lang="en-CH"/>
           </a:p>
@@ -2393,7 +2398,7 @@
           <a:p>
             <a:fld id="{7992EB8D-9690-4F75-926D-7A077194FDDF}" type="datetimeFigureOut">
               <a:rPr lang="en-CH" smtClean="0"/>
-              <a:t>21/04/2023</a:t>
+              <a:t>04/05/2023</a:t>
             </a:fld>
             <a:endParaRPr lang="en-CH"/>
           </a:p>
@@ -2682,7 +2687,7 @@
           <a:p>
             <a:fld id="{7992EB8D-9690-4F75-926D-7A077194FDDF}" type="datetimeFigureOut">
               <a:rPr lang="en-CH" smtClean="0"/>
-              <a:t>21/04/2023</a:t>
+              <a:t>04/05/2023</a:t>
             </a:fld>
             <a:endParaRPr lang="en-CH"/>
           </a:p>
@@ -2925,7 +2930,7 @@
           <a:p>
             <a:fld id="{7992EB8D-9690-4F75-926D-7A077194FDDF}" type="datetimeFigureOut">
               <a:rPr lang="en-CH" smtClean="0"/>
-              <a:t>21/04/2023</a:t>
+              <a:t>04/05/2023</a:t>
             </a:fld>
             <a:endParaRPr lang="en-CH"/>
           </a:p>
@@ -4826,7 +4831,7 @@
         </p:nvGrpSpPr>
         <p:grpSpPr>
           <a:xfrm rot="16200000">
-            <a:off x="1591879" y="4002538"/>
+            <a:off x="713686" y="3407701"/>
             <a:ext cx="2655341" cy="1059941"/>
             <a:chOff x="4619143" y="2482006"/>
             <a:chExt cx="2655341" cy="1059941"/>
@@ -5182,7 +5187,7 @@
         </p:nvSpPr>
         <p:spPr>
           <a:xfrm rot="16200000">
-            <a:off x="7584906" y="3805791"/>
+            <a:off x="3933705" y="3977152"/>
             <a:ext cx="1407561" cy="671869"/>
           </a:xfrm>
           <a:prstGeom prst="rect">
@@ -5231,7 +5236,7 @@
         </p:nvSpPr>
         <p:spPr>
           <a:xfrm>
-            <a:off x="5361167" y="3437945"/>
+            <a:off x="7348328" y="3521651"/>
             <a:ext cx="1395315" cy="1395316"/>
           </a:xfrm>
           <a:prstGeom prst="rect">
@@ -5288,7 +5293,7 @@
         </p:nvSpPr>
         <p:spPr>
           <a:xfrm>
-            <a:off x="3861861" y="3437945"/>
+            <a:off x="5572045" y="3519808"/>
             <a:ext cx="1395315" cy="1395318"/>
           </a:xfrm>
           <a:prstGeom prst="rect">
@@ -5344,8 +5349,8 @@
           <p:nvPr/>
         </p:nvSpPr>
         <p:spPr>
-          <a:xfrm rot="16200000">
-            <a:off x="6652009" y="3677294"/>
+          <a:xfrm>
+            <a:off x="5623560" y="5316568"/>
             <a:ext cx="1395315" cy="941109"/>
           </a:xfrm>
           <a:prstGeom prst="rect">
@@ -5392,18 +5397,18 @@
           <p:cNvCxnSpPr>
             <a:cxnSpLocks/>
             <a:stCxn id="103" idx="2"/>
-            <a:endCxn id="105" idx="1"/>
+            <a:endCxn id="105" idx="0"/>
           </p:cNvCxnSpPr>
           <p:nvPr/>
         </p:nvCxnSpPr>
         <p:spPr>
-          <a:xfrm rot="5400000" flipV="1">
-            <a:off x="6698123" y="4193962"/>
-            <a:ext cx="12245" cy="1290842"/>
+          <a:xfrm rot="5400000">
+            <a:off x="6983802" y="4254383"/>
+            <a:ext cx="399601" cy="1724768"/>
           </a:xfrm>
           <a:prstGeom prst="curvedConnector3">
             <a:avLst>
-              <a:gd name="adj1" fmla="val 1866884"/>
+              <a:gd name="adj1" fmla="val 50000"/>
             </a:avLst>
           </a:prstGeom>
           <a:ln w="28575"/>
@@ -5435,18 +5440,18 @@
           <p:cNvCxnSpPr>
             <a:cxnSpLocks/>
             <a:stCxn id="104" idx="2"/>
-            <a:endCxn id="105" idx="1"/>
+            <a:endCxn id="105" idx="0"/>
           </p:cNvCxnSpPr>
           <p:nvPr/>
         </p:nvCxnSpPr>
         <p:spPr>
-          <a:xfrm rot="5400000" flipV="1">
-            <a:off x="5948471" y="3444310"/>
-            <a:ext cx="12243" cy="2790148"/>
+          <a:xfrm rot="16200000" flipH="1">
+            <a:off x="6094739" y="5090089"/>
+            <a:ext cx="401442" cy="51515"/>
           </a:xfrm>
           <a:prstGeom prst="curvedConnector3">
             <a:avLst>
-              <a:gd name="adj1" fmla="val 2800784"/>
+              <a:gd name="adj1" fmla="val 50000"/>
             </a:avLst>
           </a:prstGeom>
           <a:ln w="28575"/>
@@ -5484,13 +5489,13 @@
         </p:nvCxnSpPr>
         <p:spPr>
           <a:xfrm>
-            <a:off x="3286859" y="3937892"/>
-            <a:ext cx="5001827" cy="907614"/>
+            <a:off x="2408667" y="3343055"/>
+            <a:ext cx="2228819" cy="1673812"/>
           </a:xfrm>
           <a:prstGeom prst="curvedConnector4">
             <a:avLst>
-              <a:gd name="adj1" fmla="val 6530"/>
-              <a:gd name="adj2" fmla="val 192352"/>
+              <a:gd name="adj1" fmla="val 22078"/>
+              <a:gd name="adj2" fmla="val 113657"/>
             </a:avLst>
           </a:prstGeom>
           <a:ln w="28575"/>
@@ -5521,64 +5526,18 @@
           </p:cNvPr>
           <p:cNvCxnSpPr>
             <a:cxnSpLocks/>
-            <a:endCxn id="103" idx="0"/>
-          </p:cNvCxnSpPr>
-          <p:nvPr/>
-        </p:nvCxnSpPr>
-        <p:spPr>
-          <a:xfrm flipV="1">
-            <a:off x="3286853" y="3437946"/>
-            <a:ext cx="2771971" cy="504997"/>
-          </a:xfrm>
-          <a:prstGeom prst="curvedConnector4">
-            <a:avLst>
-              <a:gd name="adj1" fmla="val 11301"/>
-              <a:gd name="adj2" fmla="val 176704"/>
-            </a:avLst>
-          </a:prstGeom>
-          <a:ln w="28575"/>
-        </p:spPr>
-        <p:style>
-          <a:lnRef idx="1">
-            <a:schemeClr val="accent2"/>
-          </a:lnRef>
-          <a:fillRef idx="0">
-            <a:schemeClr val="accent2"/>
-          </a:fillRef>
-          <a:effectRef idx="0">
-            <a:schemeClr val="accent2"/>
-          </a:effectRef>
-          <a:fontRef idx="minor">
-            <a:schemeClr val="tx1"/>
-          </a:fontRef>
-        </p:style>
-      </p:cxnSp>
-      <p:cxnSp>
-        <p:nvCxnSpPr>
-          <p:cNvPr id="146" name="Connector: Curved 145">
-            <a:extLst>
-              <a:ext uri="{FF2B5EF4-FFF2-40B4-BE49-F238E27FC236}">
-                <a16:creationId xmlns:a16="http://schemas.microsoft.com/office/drawing/2014/main" id="{F6223EF7-E15D-8DA7-BD4B-8A7BCB143BD1}"/>
-              </a:ext>
-            </a:extLst>
-          </p:cNvPr>
-          <p:cNvCxnSpPr>
-            <a:cxnSpLocks/>
             <a:stCxn id="100" idx="3"/>
             <a:endCxn id="104" idx="0"/>
           </p:cNvCxnSpPr>
           <p:nvPr/>
         </p:nvCxnSpPr>
         <p:spPr>
-          <a:xfrm flipV="1">
-            <a:off x="3286859" y="3437946"/>
-            <a:ext cx="1272659" cy="499947"/>
+          <a:xfrm>
+            <a:off x="2408667" y="3343055"/>
+            <a:ext cx="3861036" cy="176753"/>
           </a:xfrm>
-          <a:prstGeom prst="curvedConnector4">
-            <a:avLst>
-              <a:gd name="adj1" fmla="val 22590"/>
-              <a:gd name="adj2" fmla="val 145725"/>
-            </a:avLst>
+          <a:prstGeom prst="curvedConnector2">
+            <a:avLst/>
           </a:prstGeom>
           <a:ln w="28575"/>
         </p:spPr>
@@ -5608,20 +5567,18 @@
           </p:cNvPr>
           <p:cNvCxnSpPr>
             <a:cxnSpLocks/>
-            <a:stCxn id="105" idx="3"/>
-            <a:endCxn id="102" idx="3"/>
+            <a:stCxn id="105" idx="1"/>
+            <a:endCxn id="115" idx="1"/>
           </p:cNvCxnSpPr>
           <p:nvPr/>
         </p:nvCxnSpPr>
         <p:spPr>
-          <a:xfrm rot="16200000">
-            <a:off x="7813054" y="2974558"/>
-            <a:ext cx="12246" cy="939020"/>
+          <a:xfrm rot="10800000">
+            <a:off x="3899266" y="5016867"/>
+            <a:ext cx="1724294" cy="770257"/>
           </a:xfrm>
-          <a:prstGeom prst="curvedConnector3">
-            <a:avLst>
-              <a:gd name="adj1" fmla="val 2190078"/>
-            </a:avLst>
+          <a:prstGeom prst="curvedConnector2">
+            <a:avLst/>
           </a:prstGeom>
           <a:ln w="28575"/>
         </p:spPr>
@@ -5651,15 +5608,15 @@
           </p:cNvPr>
           <p:cNvCxnSpPr>
             <a:cxnSpLocks/>
-            <a:stCxn id="103" idx="0"/>
+            <a:stCxn id="104" idx="0"/>
             <a:endCxn id="5" idx="2"/>
           </p:cNvCxnSpPr>
           <p:nvPr/>
         </p:nvCxnSpPr>
         <p:spPr>
           <a:xfrm rot="5400000" flipH="1" flipV="1">
-            <a:off x="6367826" y="1401144"/>
-            <a:ext cx="1727800" cy="2345802"/>
+            <a:off x="6432334" y="1547515"/>
+            <a:ext cx="1809663" cy="2134924"/>
           </a:xfrm>
           <a:prstGeom prst="curvedConnector3">
             <a:avLst>
@@ -6111,12 +6068,12 @@
         </p:nvCxnSpPr>
         <p:spPr>
           <a:xfrm rot="5400000" flipH="1" flipV="1">
-            <a:off x="7881425" y="1591843"/>
-            <a:ext cx="23502" cy="3668703"/>
+            <a:off x="8833153" y="2627276"/>
+            <a:ext cx="107208" cy="1681542"/>
           </a:xfrm>
           <a:prstGeom prst="curvedConnector3">
             <a:avLst>
-              <a:gd name="adj1" fmla="val 2585746"/>
+              <a:gd name="adj1" fmla="val 313230"/>
             </a:avLst>
           </a:prstGeom>
           <a:ln w="28575"/>
@@ -6147,19 +6104,19 @@
           </p:cNvPr>
           <p:cNvCxnSpPr>
             <a:cxnSpLocks/>
-            <a:stCxn id="105" idx="3"/>
+            <a:stCxn id="105" idx="0"/>
             <a:endCxn id="44" idx="4"/>
           </p:cNvCxnSpPr>
           <p:nvPr/>
         </p:nvCxnSpPr>
         <p:spPr>
           <a:xfrm rot="16200000" flipV="1">
-            <a:off x="5074646" y="1175169"/>
-            <a:ext cx="2160933" cy="2389111"/>
+            <a:off x="3627232" y="2622582"/>
+            <a:ext cx="4027310" cy="1360662"/>
           </a:xfrm>
           <a:prstGeom prst="curvedConnector3">
             <a:avLst>
-              <a:gd name="adj1" fmla="val 50000"/>
+              <a:gd name="adj1" fmla="val 3791"/>
             </a:avLst>
           </a:prstGeom>
         </p:spPr>
@@ -6178,6 +6135,349 @@
           </a:fontRef>
         </p:style>
       </p:cxnSp>
+      <p:cxnSp>
+        <p:nvCxnSpPr>
+          <p:cNvPr id="112" name="Connector: Curved 111">
+            <a:extLst>
+              <a:ext uri="{FF2B5EF4-FFF2-40B4-BE49-F238E27FC236}">
+                <a16:creationId xmlns:a16="http://schemas.microsoft.com/office/drawing/2014/main" id="{29BFD10A-6F87-8411-6462-C488040F5578}"/>
+              </a:ext>
+            </a:extLst>
+          </p:cNvPr>
+          <p:cNvCxnSpPr>
+            <a:cxnSpLocks/>
+            <a:stCxn id="103" idx="0"/>
+            <a:endCxn id="104" idx="0"/>
+          </p:cNvCxnSpPr>
+          <p:nvPr/>
+        </p:nvCxnSpPr>
+        <p:spPr>
+          <a:xfrm rot="16200000" flipV="1">
+            <a:off x="7156924" y="2632588"/>
+            <a:ext cx="1843" cy="1776283"/>
+          </a:xfrm>
+          <a:prstGeom prst="curvedConnector3">
+            <a:avLst>
+              <a:gd name="adj1" fmla="val 12503690"/>
+            </a:avLst>
+          </a:prstGeom>
+          <a:ln w="28575"/>
+        </p:spPr>
+        <p:style>
+          <a:lnRef idx="1">
+            <a:schemeClr val="accent2"/>
+          </a:lnRef>
+          <a:fillRef idx="0">
+            <a:schemeClr val="accent2"/>
+          </a:fillRef>
+          <a:effectRef idx="0">
+            <a:schemeClr val="accent2"/>
+          </a:effectRef>
+          <a:fontRef idx="minor">
+            <a:schemeClr val="tx1"/>
+          </a:fontRef>
+        </p:style>
+      </p:cxnSp>
+      <p:sp>
+        <p:nvSpPr>
+          <p:cNvPr id="115" name="Rectangle 114">
+            <a:extLst>
+              <a:ext uri="{FF2B5EF4-FFF2-40B4-BE49-F238E27FC236}">
+                <a16:creationId xmlns:a16="http://schemas.microsoft.com/office/drawing/2014/main" id="{112CCC98-4E81-7B20-CBD0-9FE23D291706}"/>
+              </a:ext>
+            </a:extLst>
+          </p:cNvPr>
+          <p:cNvSpPr/>
+          <p:nvPr/>
+        </p:nvSpPr>
+        <p:spPr>
+          <a:xfrm rot="16200000">
+            <a:off x="3195485" y="3977151"/>
+            <a:ext cx="1407561" cy="671869"/>
+          </a:xfrm>
+          <a:prstGeom prst="rect">
+            <a:avLst/>
+          </a:prstGeom>
+        </p:spPr>
+        <p:style>
+          <a:lnRef idx="2">
+            <a:schemeClr val="accent1">
+              <a:shade val="50000"/>
+            </a:schemeClr>
+          </a:lnRef>
+          <a:fillRef idx="1">
+            <a:schemeClr val="accent1"/>
+          </a:fillRef>
+          <a:effectRef idx="0">
+            <a:schemeClr val="accent1"/>
+          </a:effectRef>
+          <a:fontRef idx="minor">
+            <a:schemeClr val="lt1"/>
+          </a:fontRef>
+        </p:style>
+        <p:txBody>
+          <a:bodyPr rtlCol="0" anchor="ctr"/>
+          <a:lstStyle/>
+          <a:p>
+            <a:pPr algn="ctr"/>
+            <a:r>
+              <a:rPr lang="en-US" dirty="0"/>
+              <a:t>5V</a:t>
+            </a:r>
+            <a:r>
+              <a:rPr lang="en-CH" dirty="0"/>
+              <a:t> PS</a:t>
+            </a:r>
+          </a:p>
+        </p:txBody>
+      </p:sp>
+      <p:cxnSp>
+        <p:nvCxnSpPr>
+          <p:cNvPr id="120" name="Connector: Curved 119">
+            <a:extLst>
+              <a:ext uri="{FF2B5EF4-FFF2-40B4-BE49-F238E27FC236}">
+                <a16:creationId xmlns:a16="http://schemas.microsoft.com/office/drawing/2014/main" id="{910E17FF-7A5E-BE14-D7D0-CACDBFF0EDED}"/>
+              </a:ext>
+            </a:extLst>
+          </p:cNvPr>
+          <p:cNvCxnSpPr>
+            <a:cxnSpLocks/>
+            <a:endCxn id="115" idx="1"/>
+          </p:cNvCxnSpPr>
+          <p:nvPr/>
+        </p:nvCxnSpPr>
+        <p:spPr>
+          <a:xfrm rot="16200000" flipH="1">
+            <a:off x="2469460" y="3587060"/>
+            <a:ext cx="1521412" cy="1338200"/>
+          </a:xfrm>
+          <a:prstGeom prst="curvedConnector3">
+            <a:avLst>
+              <a:gd name="adj1" fmla="val 111588"/>
+            </a:avLst>
+          </a:prstGeom>
+          <a:ln w="28575"/>
+        </p:spPr>
+        <p:style>
+          <a:lnRef idx="1">
+            <a:schemeClr val="accent2"/>
+          </a:lnRef>
+          <a:fillRef idx="0">
+            <a:schemeClr val="accent2"/>
+          </a:fillRef>
+          <a:effectRef idx="0">
+            <a:schemeClr val="accent2"/>
+          </a:effectRef>
+          <a:fontRef idx="minor">
+            <a:schemeClr val="tx1"/>
+          </a:fontRef>
+        </p:style>
+      </p:cxnSp>
+      <p:grpSp>
+        <p:nvGrpSpPr>
+          <p:cNvPr id="123" name="Group 122">
+            <a:extLst>
+              <a:ext uri="{FF2B5EF4-FFF2-40B4-BE49-F238E27FC236}">
+                <a16:creationId xmlns:a16="http://schemas.microsoft.com/office/drawing/2014/main" id="{08FDA774-8667-12E5-BEF8-3A9471D80B24}"/>
+              </a:ext>
+            </a:extLst>
+          </p:cNvPr>
+          <p:cNvGrpSpPr/>
+          <p:nvPr/>
+        </p:nvGrpSpPr>
+        <p:grpSpPr>
+          <a:xfrm>
+            <a:off x="7600934" y="825647"/>
+            <a:ext cx="512002" cy="883024"/>
+            <a:chOff x="7630135" y="2595008"/>
+            <a:chExt cx="512002" cy="883024"/>
+          </a:xfrm>
+        </p:grpSpPr>
+        <p:sp>
+          <p:nvSpPr>
+            <p:cNvPr id="125" name="Rectangle 124">
+              <a:extLst>
+                <a:ext uri="{FF2B5EF4-FFF2-40B4-BE49-F238E27FC236}">
+                  <a16:creationId xmlns:a16="http://schemas.microsoft.com/office/drawing/2014/main" id="{3D770933-0FD6-EDB4-FE4A-8E8CC3794C18}"/>
+                </a:ext>
+              </a:extLst>
+            </p:cNvPr>
+            <p:cNvSpPr/>
+            <p:nvPr/>
+          </p:nvSpPr>
+          <p:spPr>
+            <a:xfrm>
+              <a:off x="7630135" y="2595008"/>
+              <a:ext cx="512002" cy="883024"/>
+            </a:xfrm>
+            <a:prstGeom prst="rect">
+              <a:avLst/>
+            </a:prstGeom>
+          </p:spPr>
+          <p:style>
+            <a:lnRef idx="2">
+              <a:schemeClr val="accent1">
+                <a:shade val="50000"/>
+              </a:schemeClr>
+            </a:lnRef>
+            <a:fillRef idx="1">
+              <a:schemeClr val="accent1"/>
+            </a:fillRef>
+            <a:effectRef idx="0">
+              <a:schemeClr val="accent1"/>
+            </a:effectRef>
+            <a:fontRef idx="minor">
+              <a:schemeClr val="lt1"/>
+            </a:fontRef>
+          </p:style>
+          <p:txBody>
+            <a:bodyPr rtlCol="0" anchor="ctr"/>
+            <a:lstStyle/>
+            <a:p>
+              <a:pPr algn="ctr"/>
+              <a:endParaRPr lang="en-CH"/>
+            </a:p>
+          </p:txBody>
+        </p:sp>
+        <p:sp>
+          <p:nvSpPr>
+            <p:cNvPr id="126" name="Oval 125">
+              <a:extLst>
+                <a:ext uri="{FF2B5EF4-FFF2-40B4-BE49-F238E27FC236}">
+                  <a16:creationId xmlns:a16="http://schemas.microsoft.com/office/drawing/2014/main" id="{49E3BD72-C986-B74A-D2F3-601F7C953C7B}"/>
+                </a:ext>
+              </a:extLst>
+            </p:cNvPr>
+            <p:cNvSpPr/>
+            <p:nvPr/>
+          </p:nvSpPr>
+          <p:spPr>
+            <a:xfrm>
+              <a:off x="7736619" y="2751151"/>
+              <a:ext cx="143124" cy="143124"/>
+            </a:xfrm>
+            <a:prstGeom prst="ellipse">
+              <a:avLst/>
+            </a:prstGeom>
+          </p:spPr>
+          <p:style>
+            <a:lnRef idx="2">
+              <a:schemeClr val="accent6">
+                <a:shade val="50000"/>
+              </a:schemeClr>
+            </a:lnRef>
+            <a:fillRef idx="1">
+              <a:schemeClr val="accent6"/>
+            </a:fillRef>
+            <a:effectRef idx="0">
+              <a:schemeClr val="accent6"/>
+            </a:effectRef>
+            <a:fontRef idx="minor">
+              <a:schemeClr val="lt1"/>
+            </a:fontRef>
+          </p:style>
+          <p:txBody>
+            <a:bodyPr rtlCol="0" anchor="ctr"/>
+            <a:lstStyle/>
+            <a:p>
+              <a:pPr algn="ctr"/>
+              <a:endParaRPr lang="en-CH"/>
+            </a:p>
+          </p:txBody>
+        </p:sp>
+        <p:sp>
+          <p:nvSpPr>
+            <p:cNvPr id="127" name="Oval 126">
+              <a:extLst>
+                <a:ext uri="{FF2B5EF4-FFF2-40B4-BE49-F238E27FC236}">
+                  <a16:creationId xmlns:a16="http://schemas.microsoft.com/office/drawing/2014/main" id="{89C40DE4-791F-7110-E010-1B348D37556A}"/>
+                </a:ext>
+              </a:extLst>
+            </p:cNvPr>
+            <p:cNvSpPr/>
+            <p:nvPr/>
+          </p:nvSpPr>
+          <p:spPr>
+            <a:xfrm>
+              <a:off x="7960581" y="2975113"/>
+              <a:ext cx="143124" cy="143124"/>
+            </a:xfrm>
+            <a:prstGeom prst="ellipse">
+              <a:avLst/>
+            </a:prstGeom>
+          </p:spPr>
+          <p:style>
+            <a:lnRef idx="2">
+              <a:schemeClr val="accent6">
+                <a:shade val="50000"/>
+              </a:schemeClr>
+            </a:lnRef>
+            <a:fillRef idx="1">
+              <a:schemeClr val="accent6"/>
+            </a:fillRef>
+            <a:effectRef idx="0">
+              <a:schemeClr val="accent6"/>
+            </a:effectRef>
+            <a:fontRef idx="minor">
+              <a:schemeClr val="lt1"/>
+            </a:fontRef>
+          </p:style>
+          <p:txBody>
+            <a:bodyPr rtlCol="0" anchor="ctr"/>
+            <a:lstStyle/>
+            <a:p>
+              <a:pPr algn="ctr"/>
+              <a:endParaRPr lang="en-CH"/>
+            </a:p>
+          </p:txBody>
+        </p:sp>
+        <p:sp>
+          <p:nvSpPr>
+            <p:cNvPr id="129" name="Oval 128">
+              <a:extLst>
+                <a:ext uri="{FF2B5EF4-FFF2-40B4-BE49-F238E27FC236}">
+                  <a16:creationId xmlns:a16="http://schemas.microsoft.com/office/drawing/2014/main" id="{5861F91B-1B92-9785-7584-B99992B1723C}"/>
+                </a:ext>
+              </a:extLst>
+            </p:cNvPr>
+            <p:cNvSpPr/>
+            <p:nvPr/>
+          </p:nvSpPr>
+          <p:spPr>
+            <a:xfrm>
+              <a:off x="7736619" y="3193774"/>
+              <a:ext cx="143124" cy="143124"/>
+            </a:xfrm>
+            <a:prstGeom prst="ellipse">
+              <a:avLst/>
+            </a:prstGeom>
+          </p:spPr>
+          <p:style>
+            <a:lnRef idx="2">
+              <a:schemeClr val="accent6">
+                <a:shade val="50000"/>
+              </a:schemeClr>
+            </a:lnRef>
+            <a:fillRef idx="1">
+              <a:schemeClr val="accent6"/>
+            </a:fillRef>
+            <a:effectRef idx="0">
+              <a:schemeClr val="accent6"/>
+            </a:effectRef>
+            <a:fontRef idx="minor">
+              <a:schemeClr val="lt1"/>
+            </a:fontRef>
+          </p:style>
+          <p:txBody>
+            <a:bodyPr rtlCol="0" anchor="ctr"/>
+            <a:lstStyle/>
+            <a:p>
+              <a:pPr algn="ctr"/>
+              <a:endParaRPr lang="en-CH"/>
+            </a:p>
+          </p:txBody>
+        </p:sp>
+      </p:grpSp>
     </p:spTree>
     <p:extLst>
       <p:ext uri="{BB962C8B-B14F-4D97-AF65-F5344CB8AC3E}">

</xml_diff>